<commit_message>
dates updates in PPT
</commit_message>
<xml_diff>
--- a/aulas/t/old/SCO-T1-A09-A10.pptx
+++ b/aulas/t/old/SCO-T1-A09-A10.pptx
@@ -14,10 +14,10 @@
     <p:sldId id="256" r:id="rId2"/>
     <p:sldId id="315" r:id="rId3"/>
     <p:sldId id="441" r:id="rId4"/>
-    <p:sldId id="444" r:id="rId5"/>
-    <p:sldId id="445" r:id="rId6"/>
-    <p:sldId id="446" r:id="rId7"/>
-    <p:sldId id="427" r:id="rId8"/>
+    <p:sldId id="427" r:id="rId5"/>
+    <p:sldId id="444" r:id="rId6"/>
+    <p:sldId id="445" r:id="rId7"/>
+    <p:sldId id="446" r:id="rId8"/>
     <p:sldId id="430" r:id="rId9"/>
     <p:sldId id="447" r:id="rId10"/>
     <p:sldId id="429" r:id="rId11"/>
@@ -3783,7 +3783,7 @@
     </p:spTree>
     <p:extLst>
       <p:ext uri="{BB962C8B-B14F-4D97-AF65-F5344CB8AC3E}">
-        <p14:creationId xmlns:p14="http://schemas.microsoft.com/office/powerpoint/2010/main" val="1873515641"/>
+        <p14:creationId xmlns:p14="http://schemas.microsoft.com/office/powerpoint/2010/main" val="1049947917"/>
       </p:ext>
     </p:extLst>
   </p:cSld>
@@ -3869,14 +3869,17 @@
           <a:bodyPr/>
           <a:lstStyle/>
           <a:p>
-            <a:endParaRPr lang="en-GB" dirty="0"/>
+            <a:r>
+              <a:rPr lang="en-GB" dirty="0"/>
+              <a:t>https://en.wikipedia.org/wiki/Control_unit</a:t>
+            </a:r>
           </a:p>
         </p:txBody>
       </p:sp>
     </p:spTree>
     <p:extLst>
       <p:ext uri="{BB962C8B-B14F-4D97-AF65-F5344CB8AC3E}">
-        <p14:creationId xmlns:p14="http://schemas.microsoft.com/office/powerpoint/2010/main" val="4062742777"/>
+        <p14:creationId xmlns:p14="http://schemas.microsoft.com/office/powerpoint/2010/main" val="1873515641"/>
       </p:ext>
     </p:extLst>
   </p:cSld>
@@ -3962,49 +3965,14 @@
           <a:bodyPr/>
           <a:lstStyle/>
           <a:p>
-            <a:r>
-              <a:rPr lang="en-GB" dirty="0"/>
-              <a:t>As </a:t>
-            </a:r>
-            <a:r>
-              <a:rPr lang="en-GB" dirty="0" err="1"/>
-              <a:t>etapas</a:t>
-            </a:r>
-            <a:r>
-              <a:rPr lang="en-GB" dirty="0"/>
-              <a:t> F D E </a:t>
-            </a:r>
-            <a:r>
-              <a:rPr lang="en-GB" dirty="0" err="1"/>
-              <a:t>e</a:t>
-            </a:r>
-            <a:r>
-              <a:rPr lang="en-GB" dirty="0"/>
-              <a:t> S </a:t>
-            </a:r>
-            <a:r>
-              <a:rPr lang="en-GB" dirty="0" err="1"/>
-              <a:t>podem</a:t>
-            </a:r>
-            <a:r>
-              <a:rPr lang="en-GB" dirty="0"/>
-              <a:t> ser </a:t>
-            </a:r>
-            <a:r>
-              <a:rPr lang="en-GB" dirty="0" err="1"/>
-              <a:t>subdividadas</a:t>
-            </a:r>
-            <a:r>
-              <a:rPr lang="en-GB" dirty="0"/>
-              <a:t>.</a:t>
-            </a:r>
+            <a:endParaRPr lang="en-GB" dirty="0"/>
           </a:p>
         </p:txBody>
       </p:sp>
     </p:spTree>
     <p:extLst>
       <p:ext uri="{BB962C8B-B14F-4D97-AF65-F5344CB8AC3E}">
-        <p14:creationId xmlns:p14="http://schemas.microsoft.com/office/powerpoint/2010/main" val="1744763283"/>
+        <p14:creationId xmlns:p14="http://schemas.microsoft.com/office/powerpoint/2010/main" val="4062742777"/>
       </p:ext>
     </p:extLst>
   </p:cSld>
@@ -4092,7 +4060,39 @@
           <a:p>
             <a:r>
               <a:rPr lang="en-GB" dirty="0"/>
-              <a:t>https://en.wikipedia.org/wiki/Control_unit</a:t>
+              <a:t>As </a:t>
+            </a:r>
+            <a:r>
+              <a:rPr lang="en-GB" dirty="0" err="1"/>
+              <a:t>etapas</a:t>
+            </a:r>
+            <a:r>
+              <a:rPr lang="en-GB" dirty="0"/>
+              <a:t> F D E </a:t>
+            </a:r>
+            <a:r>
+              <a:rPr lang="en-GB" dirty="0" err="1"/>
+              <a:t>e</a:t>
+            </a:r>
+            <a:r>
+              <a:rPr lang="en-GB" dirty="0"/>
+              <a:t> S </a:t>
+            </a:r>
+            <a:r>
+              <a:rPr lang="en-GB" dirty="0" err="1"/>
+              <a:t>podem</a:t>
+            </a:r>
+            <a:r>
+              <a:rPr lang="en-GB" dirty="0"/>
+              <a:t> ser </a:t>
+            </a:r>
+            <a:r>
+              <a:rPr lang="en-GB" dirty="0" err="1"/>
+              <a:t>subdividadas</a:t>
+            </a:r>
+            <a:r>
+              <a:rPr lang="en-GB" dirty="0"/>
+              <a:t>.</a:t>
             </a:r>
           </a:p>
         </p:txBody>
@@ -4100,7 +4100,7 @@
     </p:spTree>
     <p:extLst>
       <p:ext uri="{BB962C8B-B14F-4D97-AF65-F5344CB8AC3E}">
-        <p14:creationId xmlns:p14="http://schemas.microsoft.com/office/powerpoint/2010/main" val="1049947917"/>
+        <p14:creationId xmlns:p14="http://schemas.microsoft.com/office/powerpoint/2010/main" val="1744763283"/>
       </p:ext>
     </p:extLst>
   </p:cSld>
@@ -7533,7 +7533,7 @@
                 </a:solidFill>
                 <a:latin typeface="Arial" charset="0"/>
               </a:rPr>
-              <a:t>SCO-T1-A09</a:t>
+              <a:t>SCO-T1-A10</a:t>
             </a:r>
             <a:br>
               <a:rPr lang="pt-PT" sz="1000" b="1" i="1" dirty="0">
@@ -7992,7 +7992,7 @@
                 </a:solidFill>
                 <a:latin typeface="Arial" charset="0"/>
               </a:rPr>
-              <a:t>SCO-T1-A09</a:t>
+              <a:t>SCO-T1-A10</a:t>
             </a:r>
             <a:br>
               <a:rPr lang="pt-PT" sz="1000" b="1" i="1" dirty="0">
@@ -8417,7 +8417,7 @@
                 </a:solidFill>
                 <a:latin typeface="Arial" charset="0"/>
               </a:rPr>
-              <a:t>SCO-T1-A09</a:t>
+              <a:t>SCO-T1-A10</a:t>
             </a:r>
             <a:br>
               <a:rPr lang="pt-PT" sz="1000" b="1" i="1" dirty="0">
@@ -12820,23 +12820,15 @@
             </a:pPr>
             <a:r>
               <a:rPr lang="pt-PT" sz="1600" b="0" i="0" dirty="0"/>
-              <a:t>Decomposição temporal e espacial: </a:t>
-            </a:r>
-            <a:r>
-              <a:rPr lang="pt-PT" sz="1600" b="0" dirty="0"/>
-              <a:t>Pipeline</a:t>
+              <a:t>Arquiteturas </a:t>
+            </a:r>
+            <a:r>
+              <a:rPr lang="pt-PT" sz="1600" b="0" dirty="0" err="1"/>
+              <a:t>Hardwire</a:t>
             </a:r>
             <a:r>
               <a:rPr lang="pt-PT" sz="1600" b="0" i="0" dirty="0"/>
-              <a:t> e </a:t>
-            </a:r>
-            <a:r>
-              <a:rPr lang="pt-PT" sz="1600" b="0" i="0" dirty="0" err="1"/>
-              <a:t>escalaridade</a:t>
-            </a:r>
-            <a:r>
-              <a:rPr lang="pt-PT" sz="1600" b="0" i="0" dirty="0"/>
-              <a:t>;</a:t>
+              <a:t> e micro programado;</a:t>
             </a:r>
           </a:p>
           <a:p>
@@ -12849,15 +12841,23 @@
             </a:pPr>
             <a:r>
               <a:rPr lang="pt-PT" sz="1600" b="0" i="0" dirty="0"/>
-              <a:t>Arquiteturas </a:t>
-            </a:r>
-            <a:r>
-              <a:rPr lang="pt-PT" sz="1600" b="0" dirty="0" err="1"/>
-              <a:t>Hardwire</a:t>
+              <a:t>Decomposição temporal e espacial: </a:t>
+            </a:r>
+            <a:r>
+              <a:rPr lang="pt-PT" sz="1600" b="0" dirty="0"/>
+              <a:t>Pipeline</a:t>
             </a:r>
             <a:r>
               <a:rPr lang="pt-PT" sz="1600" b="0" i="0" dirty="0"/>
-              <a:t> e micro programado;</a:t>
+              <a:t> e </a:t>
+            </a:r>
+            <a:r>
+              <a:rPr lang="pt-PT" sz="1600" b="0" i="0" dirty="0" err="1"/>
+              <a:t>escalaridade</a:t>
+            </a:r>
+            <a:r>
+              <a:rPr lang="pt-PT" sz="1600" b="0" i="0" dirty="0"/>
+              <a:t>;</a:t>
             </a:r>
           </a:p>
           <a:p>
@@ -15086,7 +15086,7 @@
         <p:spPr bwMode="auto">
           <a:xfrm>
             <a:off x="540000" y="841276"/>
-            <a:ext cx="8064448" cy="3568914"/>
+            <a:ext cx="8064448" cy="3938245"/>
           </a:xfrm>
           <a:prstGeom prst="rect">
             <a:avLst/>
@@ -15146,12 +15146,17 @@
             </a:pPr>
             <a:r>
               <a:rPr lang="pt-PT" sz="2800" b="0" i="0" dirty="0"/>
-              <a:t>Password Geral: </a:t>
-            </a:r>
-            <a:r>
-              <a:rPr lang="pt-PT" sz="2800" i="0" dirty="0"/>
-              <a:t>sc2021</a:t>
-            </a:r>
+              <a:t>Password Geral</a:t>
+            </a:r>
+            <a:r>
+              <a:rPr lang="pt-PT" sz="2800" b="0" i="0"/>
+              <a:t>: </a:t>
+            </a:r>
+            <a:r>
+              <a:rPr lang="pt-PT" sz="2800" i="0"/>
+              <a:t>sc2122</a:t>
+            </a:r>
+            <a:endParaRPr lang="pt-PT" sz="2800" i="0" dirty="0"/>
           </a:p>
           <a:p>
             <a:pPr marL="357188" lvl="1" indent="-177800" algn="l" defTabSz="704085">
@@ -15189,7 +15194,7 @@
             </a:pPr>
             <a:r>
               <a:rPr lang="pt-PT" sz="2000" i="0" dirty="0"/>
-              <a:t>2 conjuntos (base e standard) de 2 questões (em 5+) + 1 questão (em 3 do conjunto Hard)</a:t>
+              <a:t>2 conjuntos (base e standard) de 2 questões (em 5+) + 1 questão (em 3+ do conjunto Hard)</a:t>
             </a:r>
             <a:r>
               <a:rPr lang="pt-PT" sz="2000" b="0" i="0" dirty="0"/>
@@ -15210,7 +15215,15 @@
             </a:r>
             <a:r>
               <a:rPr lang="pt-PT" sz="2000" i="0" dirty="0"/>
-              <a:t>16h até às 23h59 de sexta, 12 de novembro</a:t>
+              <a:t>18h de quinta 21 de abril </a:t>
+            </a:r>
+            <a:r>
+              <a:rPr lang="pt-PT" sz="2000" b="0" i="0" dirty="0"/>
+              <a:t>até às </a:t>
+            </a:r>
+            <a:r>
+              <a:rPr lang="pt-PT" sz="2000" i="0" dirty="0"/>
+              <a:t>23h59 de sexta, 22 de abril</a:t>
             </a:r>
             <a:r>
               <a:rPr lang="pt-PT" sz="2000" b="0" i="0" dirty="0"/>
@@ -15849,6 +15862,417 @@
               </a:rPr>
             </a:br>
             <a:r>
+              <a:rPr lang="pt-PT" sz="1800" b="1" i="1" cap="small" dirty="0" err="1">
+                <a:solidFill>
+                  <a:srgbClr val="FF0000"/>
+                </a:solidFill>
+                <a:latin typeface="Arial" charset="0"/>
+              </a:rPr>
+              <a:t>Hardwire</a:t>
+            </a:r>
+            <a:r>
+              <a:rPr lang="pt-PT" sz="1800" b="1" i="1" cap="small" dirty="0">
+                <a:solidFill>
+                  <a:srgbClr val="FF0000"/>
+                </a:solidFill>
+                <a:latin typeface="Arial" charset="0"/>
+              </a:rPr>
+              <a:t> / Micro Código</a:t>
+            </a:r>
+            <a:endParaRPr lang="pt-PT" sz="1600" b="1" i="1" cap="small" dirty="0">
+              <a:solidFill>
+                <a:srgbClr val="FF0000"/>
+              </a:solidFill>
+              <a:latin typeface="Arial" charset="0"/>
+            </a:endParaRPr>
+          </a:p>
+        </p:txBody>
+      </p:sp>
+      <p:sp>
+        <p:nvSpPr>
+          <p:cNvPr id="20" name="Rectangle 23">
+            <a:extLst>
+              <a:ext uri="{FF2B5EF4-FFF2-40B4-BE49-F238E27FC236}">
+                <a16:creationId xmlns:a16="http://schemas.microsoft.com/office/drawing/2014/main" id="{4E8C842D-166F-4D53-BF52-24DABD48BE83}"/>
+              </a:ext>
+            </a:extLst>
+          </p:cNvPr>
+          <p:cNvSpPr>
+            <a:spLocks noChangeArrowheads="1"/>
+          </p:cNvSpPr>
+          <p:nvPr/>
+        </p:nvSpPr>
+        <p:spPr bwMode="auto">
+          <a:xfrm>
+            <a:off x="539552" y="841276"/>
+            <a:ext cx="3096344" cy="3355265"/>
+          </a:xfrm>
+          <a:prstGeom prst="rect">
+            <a:avLst/>
+          </a:prstGeom>
+          <a:noFill/>
+          <a:ln w="9525">
+            <a:noFill/>
+            <a:miter lim="800000"/>
+            <a:headEnd/>
+            <a:tailEnd/>
+          </a:ln>
+          <a:effectLst/>
+        </p:spPr>
+        <p:txBody>
+          <a:bodyPr wrap="square" lIns="62408" tIns="31204" rIns="62408" bIns="31204">
+            <a:spAutoFit/>
+          </a:bodyPr>
+          <a:lstStyle/>
+          <a:p>
+            <a:pPr algn="l" defTabSz="624078">
+              <a:lnSpc>
+                <a:spcPct val="120000"/>
+              </a:lnSpc>
+            </a:pPr>
+            <a:r>
+              <a:rPr lang="pt-PT" sz="2000" b="0" i="0" dirty="0" err="1"/>
+              <a:t>Hardwire</a:t>
+            </a:r>
+            <a:r>
+              <a:rPr lang="pt-PT" sz="2000" b="0" i="0" dirty="0"/>
+              <a:t>:</a:t>
+            </a:r>
+          </a:p>
+          <a:p>
+            <a:pPr marL="357188" lvl="1" indent="-177800" algn="just" defTabSz="624078">
+              <a:lnSpc>
+                <a:spcPct val="120000"/>
+              </a:lnSpc>
+              <a:buFont typeface="Wingdings" pitchFamily="2" charset="2"/>
+              <a:buChar char="Ø"/>
+            </a:pPr>
+            <a:r>
+              <a:rPr lang="pt-PT" sz="1600" b="0" i="0" dirty="0"/>
+              <a:t>O mapa de descodificação de uma instrução pode ser implementado diretamente em hardware (no CPU). Esta abordagem é mais simples e normalmente mais eficiente ,que micro código, no entanto não permite atualização da tabela de </a:t>
+            </a:r>
+            <a:r>
+              <a:rPr lang="pt-PT" sz="1600" b="0" dirty="0" err="1"/>
+              <a:t>decode</a:t>
+            </a:r>
+            <a:r>
+              <a:rPr lang="pt-PT" sz="1600" b="0" i="0" dirty="0"/>
+              <a:t> do CPU.</a:t>
+            </a:r>
+          </a:p>
+        </p:txBody>
+      </p:sp>
+      <p:pic>
+        <p:nvPicPr>
+          <p:cNvPr id="1026" name="Picture 2">
+            <a:extLst>
+              <a:ext uri="{FF2B5EF4-FFF2-40B4-BE49-F238E27FC236}">
+                <a16:creationId xmlns:a16="http://schemas.microsoft.com/office/drawing/2014/main" id="{2D03A261-E6F1-45C9-BE1A-F11216615438}"/>
+              </a:ext>
+            </a:extLst>
+          </p:cNvPr>
+          <p:cNvPicPr>
+            <a:picLocks noChangeAspect="1" noChangeArrowheads="1" noCrop="1"/>
+          </p:cNvPicPr>
+          <p:nvPr/>
+        </p:nvPicPr>
+        <p:blipFill>
+          <a:blip r:embed="rId3">
+            <a:extLst>
+              <a:ext uri="{28A0092B-C50C-407E-A947-70E740481C1C}">
+                <a14:useLocalDpi xmlns:a14="http://schemas.microsoft.com/office/drawing/2010/main" val="0"/>
+              </a:ext>
+            </a:extLst>
+          </a:blip>
+          <a:srcRect/>
+          <a:stretch>
+            <a:fillRect/>
+          </a:stretch>
+        </p:blipFill>
+        <p:spPr bwMode="auto">
+          <a:xfrm>
+            <a:off x="3683901" y="1057300"/>
+            <a:ext cx="5280587" cy="4176464"/>
+          </a:xfrm>
+          <a:prstGeom prst="rect">
+            <a:avLst/>
+          </a:prstGeom>
+          <a:noFill/>
+          <a:ln>
+            <a:solidFill>
+              <a:schemeClr val="tx1"/>
+            </a:solidFill>
+          </a:ln>
+          <a:effectLst>
+            <a:outerShdw blurRad="50800" dist="38100" dir="2700000" algn="tl" rotWithShape="0">
+              <a:prstClr val="black">
+                <a:alpha val="40000"/>
+              </a:prstClr>
+            </a:outerShdw>
+          </a:effectLst>
+          <a:extLst>
+            <a:ext uri="{909E8E84-426E-40DD-AFC4-6F175D3DCCD1}">
+              <a14:hiddenFill xmlns:a14="http://schemas.microsoft.com/office/drawing/2010/main">
+                <a:solidFill>
+                  <a:srgbClr val="FFFFFF"/>
+                </a:solidFill>
+              </a14:hiddenFill>
+            </a:ext>
+          </a:extLst>
+        </p:spPr>
+      </p:pic>
+    </p:spTree>
+    <p:extLst>
+      <p:ext uri="{BB962C8B-B14F-4D97-AF65-F5344CB8AC3E}">
+        <p14:creationId xmlns:p14="http://schemas.microsoft.com/office/powerpoint/2010/main" val="2999396643"/>
+      </p:ext>
+    </p:extLst>
+  </p:cSld>
+  <p:clrMapOvr>
+    <a:masterClrMapping/>
+  </p:clrMapOvr>
+  <p:timing>
+    <p:tnLst>
+      <p:par>
+        <p:cTn id="1" dur="indefinite" restart="never" nodeType="tmRoot">
+          <p:childTnLst>
+            <p:seq concurrent="1" nextAc="seek">
+              <p:cTn id="2" dur="indefinite" nodeType="mainSeq">
+                <p:childTnLst>
+                  <p:par>
+                    <p:cTn id="3" fill="hold">
+                      <p:stCondLst>
+                        <p:cond delay="indefinite"/>
+                        <p:cond evt="onBegin" delay="0">
+                          <p:tn val="2"/>
+                        </p:cond>
+                      </p:stCondLst>
+                      <p:childTnLst>
+                        <p:par>
+                          <p:cTn id="4" fill="hold">
+                            <p:stCondLst>
+                              <p:cond delay="0"/>
+                            </p:stCondLst>
+                            <p:childTnLst>
+                              <p:par>
+                                <p:cTn id="5" presetID="42" presetClass="entr" presetSubtype="0" fill="hold" grpId="0" nodeType="afterEffect">
+                                  <p:stCondLst>
+                                    <p:cond delay="0"/>
+                                  </p:stCondLst>
+                                  <p:childTnLst>
+                                    <p:set>
+                                      <p:cBhvr>
+                                        <p:cTn id="6" dur="1" fill="hold">
+                                          <p:stCondLst>
+                                            <p:cond delay="0"/>
+                                          </p:stCondLst>
+                                        </p:cTn>
+                                        <p:tgtEl>
+                                          <p:spTgt spid="20"/>
+                                        </p:tgtEl>
+                                        <p:attrNameLst>
+                                          <p:attrName>style.visibility</p:attrName>
+                                        </p:attrNameLst>
+                                      </p:cBhvr>
+                                      <p:to>
+                                        <p:strVal val="visible"/>
+                                      </p:to>
+                                    </p:set>
+                                    <p:animEffect transition="in" filter="fade">
+                                      <p:cBhvr>
+                                        <p:cTn id="7" dur="500"/>
+                                        <p:tgtEl>
+                                          <p:spTgt spid="20"/>
+                                        </p:tgtEl>
+                                      </p:cBhvr>
+                                    </p:animEffect>
+                                    <p:anim calcmode="lin" valueType="num">
+                                      <p:cBhvr>
+                                        <p:cTn id="8" dur="500" fill="hold"/>
+                                        <p:tgtEl>
+                                          <p:spTgt spid="20"/>
+                                        </p:tgtEl>
+                                        <p:attrNameLst>
+                                          <p:attrName>ppt_x</p:attrName>
+                                        </p:attrNameLst>
+                                      </p:cBhvr>
+                                      <p:tavLst>
+                                        <p:tav tm="0">
+                                          <p:val>
+                                            <p:strVal val="#ppt_x"/>
+                                          </p:val>
+                                        </p:tav>
+                                        <p:tav tm="100000">
+                                          <p:val>
+                                            <p:strVal val="#ppt_x"/>
+                                          </p:val>
+                                        </p:tav>
+                                      </p:tavLst>
+                                    </p:anim>
+                                    <p:anim calcmode="lin" valueType="num">
+                                      <p:cBhvr>
+                                        <p:cTn id="9" dur="500" fill="hold"/>
+                                        <p:tgtEl>
+                                          <p:spTgt spid="20"/>
+                                        </p:tgtEl>
+                                        <p:attrNameLst>
+                                          <p:attrName>ppt_y</p:attrName>
+                                        </p:attrNameLst>
+                                      </p:cBhvr>
+                                      <p:tavLst>
+                                        <p:tav tm="0">
+                                          <p:val>
+                                            <p:strVal val="#ppt_y+.1"/>
+                                          </p:val>
+                                        </p:tav>
+                                        <p:tav tm="100000">
+                                          <p:val>
+                                            <p:strVal val="#ppt_y"/>
+                                          </p:val>
+                                        </p:tav>
+                                      </p:tavLst>
+                                    </p:anim>
+                                  </p:childTnLst>
+                                </p:cTn>
+                              </p:par>
+                              <p:par>
+                                <p:cTn id="10" presetID="10" presetClass="entr" presetSubtype="0" fill="hold" nodeType="withEffect">
+                                  <p:stCondLst>
+                                    <p:cond delay="0"/>
+                                  </p:stCondLst>
+                                  <p:childTnLst>
+                                    <p:set>
+                                      <p:cBhvr>
+                                        <p:cTn id="11" dur="1" fill="hold">
+                                          <p:stCondLst>
+                                            <p:cond delay="0"/>
+                                          </p:stCondLst>
+                                        </p:cTn>
+                                        <p:tgtEl>
+                                          <p:spTgt spid="1026"/>
+                                        </p:tgtEl>
+                                        <p:attrNameLst>
+                                          <p:attrName>style.visibility</p:attrName>
+                                        </p:attrNameLst>
+                                      </p:cBhvr>
+                                      <p:to>
+                                        <p:strVal val="visible"/>
+                                      </p:to>
+                                    </p:set>
+                                    <p:animEffect transition="in" filter="fade">
+                                      <p:cBhvr>
+                                        <p:cTn id="12" dur="500"/>
+                                        <p:tgtEl>
+                                          <p:spTgt spid="1026"/>
+                                        </p:tgtEl>
+                                      </p:cBhvr>
+                                    </p:animEffect>
+                                  </p:childTnLst>
+                                </p:cTn>
+                              </p:par>
+                            </p:childTnLst>
+                          </p:cTn>
+                        </p:par>
+                      </p:childTnLst>
+                    </p:cTn>
+                  </p:par>
+                </p:childTnLst>
+              </p:cTn>
+              <p:prevCondLst>
+                <p:cond evt="onPrev" delay="0">
+                  <p:tgtEl>
+                    <p:sldTgt/>
+                  </p:tgtEl>
+                </p:cond>
+              </p:prevCondLst>
+              <p:nextCondLst>
+                <p:cond evt="onNext" delay="0">
+                  <p:tgtEl>
+                    <p:sldTgt/>
+                  </p:tgtEl>
+                </p:cond>
+              </p:nextCondLst>
+            </p:seq>
+          </p:childTnLst>
+        </p:cTn>
+      </p:par>
+    </p:tnLst>
+    <p:bldLst>
+      <p:bldP spid="20" grpId="0"/>
+    </p:bldLst>
+  </p:timing>
+</p:sld>
+</file>
+
+<file path=ppt/slides/slide5.xml><?xml version="1.0" encoding="utf-8"?>
+<p:sld xmlns:a="http://schemas.openxmlformats.org/drawingml/2006/main" xmlns:r="http://schemas.openxmlformats.org/officeDocument/2006/relationships" xmlns:p="http://schemas.openxmlformats.org/presentationml/2006/main">
+  <p:cSld>
+    <p:spTree>
+      <p:nvGrpSpPr>
+        <p:cNvPr id="1" name=""/>
+        <p:cNvGrpSpPr/>
+        <p:nvPr/>
+      </p:nvGrpSpPr>
+      <p:grpSpPr>
+        <a:xfrm>
+          <a:off x="0" y="0"/>
+          <a:ext cx="0" cy="0"/>
+          <a:chOff x="0" y="0"/>
+          <a:chExt cx="0" cy="0"/>
+        </a:xfrm>
+      </p:grpSpPr>
+      <p:sp>
+        <p:nvSpPr>
+          <p:cNvPr id="258050" name="Rectangle 2"/>
+          <p:cNvSpPr>
+            <a:spLocks noGrp="1" noChangeArrowheads="1"/>
+          </p:cNvSpPr>
+          <p:nvPr>
+            <p:ph type="title" idx="4294967295"/>
+          </p:nvPr>
+        </p:nvSpPr>
+        <p:spPr bwMode="auto">
+          <a:xfrm>
+            <a:off x="3006330" y="185698"/>
+            <a:ext cx="5310086" cy="420688"/>
+          </a:xfrm>
+          <a:prstGeom prst="rect">
+            <a:avLst/>
+          </a:prstGeom>
+          <a:noFill/>
+          <a:ln>
+            <a:miter lim="800000"/>
+            <a:headEnd/>
+            <a:tailEnd/>
+          </a:ln>
+        </p:spPr>
+        <p:txBody>
+          <a:bodyPr vert="horz" wrap="square" lIns="71323" tIns="35662" rIns="71323" bIns="35662" numCol="1" anchor="t" anchorCtr="0" compatLnSpc="1">
+            <a:prstTxWarp prst="textNoShape">
+              <a:avLst/>
+            </a:prstTxWarp>
+          </a:bodyPr>
+          <a:lstStyle/>
+          <a:p>
+            <a:pPr algn="r"/>
+            <a:r>
+              <a:rPr lang="pt-PT" sz="1000" b="1" i="1" dirty="0">
+                <a:solidFill>
+                  <a:srgbClr val="FF0000"/>
+                </a:solidFill>
+                <a:latin typeface="Arial" charset="0"/>
+              </a:rPr>
+              <a:t>SCO-T1-A09</a:t>
+            </a:r>
+            <a:br>
+              <a:rPr lang="pt-PT" sz="1000" b="1" i="1" dirty="0">
+                <a:solidFill>
+                  <a:srgbClr val="FF0000"/>
+                </a:solidFill>
+                <a:latin typeface="Arial" charset="0"/>
+              </a:rPr>
+            </a:br>
+            <a:r>
               <a:rPr lang="pt-PT" sz="1800" b="1" i="1" cap="small" dirty="0">
                 <a:solidFill>
                   <a:srgbClr val="FF0000"/>
@@ -16193,7 +16617,7 @@
 </p:sld>
 </file>
 
-<file path=ppt/slides/slide5.xml><?xml version="1.0" encoding="utf-8"?>
+<file path=ppt/slides/slide6.xml><?xml version="1.0" encoding="utf-8"?>
 <p:sld xmlns:a="http://schemas.openxmlformats.org/drawingml/2006/main" xmlns:r="http://schemas.openxmlformats.org/officeDocument/2006/relationships" xmlns:p="http://schemas.openxmlformats.org/presentationml/2006/main">
   <p:cSld>
     <p:spTree>
@@ -16583,7 +17007,7 @@
 </p:sld>
 </file>
 
-<file path=ppt/slides/slide6.xml><?xml version="1.0" encoding="utf-8"?>
+<file path=ppt/slides/slide7.xml><?xml version="1.0" encoding="utf-8"?>
 <p:sld xmlns:a="http://schemas.openxmlformats.org/drawingml/2006/main" xmlns:r="http://schemas.openxmlformats.org/officeDocument/2006/relationships" xmlns:p="http://schemas.openxmlformats.org/presentationml/2006/main">
   <p:cSld>
     <p:spTree>
@@ -20050,417 +20474,6 @@
 </p:sld>
 </file>
 
-<file path=ppt/slides/slide7.xml><?xml version="1.0" encoding="utf-8"?>
-<p:sld xmlns:a="http://schemas.openxmlformats.org/drawingml/2006/main" xmlns:r="http://schemas.openxmlformats.org/officeDocument/2006/relationships" xmlns:p="http://schemas.openxmlformats.org/presentationml/2006/main">
-  <p:cSld>
-    <p:spTree>
-      <p:nvGrpSpPr>
-        <p:cNvPr id="1" name=""/>
-        <p:cNvGrpSpPr/>
-        <p:nvPr/>
-      </p:nvGrpSpPr>
-      <p:grpSpPr>
-        <a:xfrm>
-          <a:off x="0" y="0"/>
-          <a:ext cx="0" cy="0"/>
-          <a:chOff x="0" y="0"/>
-          <a:chExt cx="0" cy="0"/>
-        </a:xfrm>
-      </p:grpSpPr>
-      <p:sp>
-        <p:nvSpPr>
-          <p:cNvPr id="258050" name="Rectangle 2"/>
-          <p:cNvSpPr>
-            <a:spLocks noGrp="1" noChangeArrowheads="1"/>
-          </p:cNvSpPr>
-          <p:nvPr>
-            <p:ph type="title" idx="4294967295"/>
-          </p:nvPr>
-        </p:nvSpPr>
-        <p:spPr bwMode="auto">
-          <a:xfrm>
-            <a:off x="3006330" y="185698"/>
-            <a:ext cx="5310086" cy="420688"/>
-          </a:xfrm>
-          <a:prstGeom prst="rect">
-            <a:avLst/>
-          </a:prstGeom>
-          <a:noFill/>
-          <a:ln>
-            <a:miter lim="800000"/>
-            <a:headEnd/>
-            <a:tailEnd/>
-          </a:ln>
-        </p:spPr>
-        <p:txBody>
-          <a:bodyPr vert="horz" wrap="square" lIns="71323" tIns="35662" rIns="71323" bIns="35662" numCol="1" anchor="t" anchorCtr="0" compatLnSpc="1">
-            <a:prstTxWarp prst="textNoShape">
-              <a:avLst/>
-            </a:prstTxWarp>
-          </a:bodyPr>
-          <a:lstStyle/>
-          <a:p>
-            <a:pPr algn="r"/>
-            <a:r>
-              <a:rPr lang="pt-PT" sz="1000" b="1" i="1" dirty="0">
-                <a:solidFill>
-                  <a:srgbClr val="FF0000"/>
-                </a:solidFill>
-                <a:latin typeface="Arial" charset="0"/>
-              </a:rPr>
-              <a:t>SCO-T1-A09</a:t>
-            </a:r>
-            <a:br>
-              <a:rPr lang="pt-PT" sz="1000" b="1" i="1" dirty="0">
-                <a:solidFill>
-                  <a:srgbClr val="FF0000"/>
-                </a:solidFill>
-                <a:latin typeface="Arial" charset="0"/>
-              </a:rPr>
-            </a:br>
-            <a:r>
-              <a:rPr lang="pt-PT" sz="1800" b="1" i="1" cap="small" dirty="0" err="1">
-                <a:solidFill>
-                  <a:srgbClr val="FF0000"/>
-                </a:solidFill>
-                <a:latin typeface="Arial" charset="0"/>
-              </a:rPr>
-              <a:t>Hardwire</a:t>
-            </a:r>
-            <a:r>
-              <a:rPr lang="pt-PT" sz="1800" b="1" i="1" cap="small" dirty="0">
-                <a:solidFill>
-                  <a:srgbClr val="FF0000"/>
-                </a:solidFill>
-                <a:latin typeface="Arial" charset="0"/>
-              </a:rPr>
-              <a:t> / Micro Código</a:t>
-            </a:r>
-            <a:endParaRPr lang="pt-PT" sz="1600" b="1" i="1" cap="small" dirty="0">
-              <a:solidFill>
-                <a:srgbClr val="FF0000"/>
-              </a:solidFill>
-              <a:latin typeface="Arial" charset="0"/>
-            </a:endParaRPr>
-          </a:p>
-        </p:txBody>
-      </p:sp>
-      <p:sp>
-        <p:nvSpPr>
-          <p:cNvPr id="20" name="Rectangle 23">
-            <a:extLst>
-              <a:ext uri="{FF2B5EF4-FFF2-40B4-BE49-F238E27FC236}">
-                <a16:creationId xmlns:a16="http://schemas.microsoft.com/office/drawing/2014/main" id="{4E8C842D-166F-4D53-BF52-24DABD48BE83}"/>
-              </a:ext>
-            </a:extLst>
-          </p:cNvPr>
-          <p:cNvSpPr>
-            <a:spLocks noChangeArrowheads="1"/>
-          </p:cNvSpPr>
-          <p:nvPr/>
-        </p:nvSpPr>
-        <p:spPr bwMode="auto">
-          <a:xfrm>
-            <a:off x="539552" y="841276"/>
-            <a:ext cx="3096344" cy="3355265"/>
-          </a:xfrm>
-          <a:prstGeom prst="rect">
-            <a:avLst/>
-          </a:prstGeom>
-          <a:noFill/>
-          <a:ln w="9525">
-            <a:noFill/>
-            <a:miter lim="800000"/>
-            <a:headEnd/>
-            <a:tailEnd/>
-          </a:ln>
-          <a:effectLst/>
-        </p:spPr>
-        <p:txBody>
-          <a:bodyPr wrap="square" lIns="62408" tIns="31204" rIns="62408" bIns="31204">
-            <a:spAutoFit/>
-          </a:bodyPr>
-          <a:lstStyle/>
-          <a:p>
-            <a:pPr algn="l" defTabSz="624078">
-              <a:lnSpc>
-                <a:spcPct val="120000"/>
-              </a:lnSpc>
-            </a:pPr>
-            <a:r>
-              <a:rPr lang="pt-PT" sz="2000" b="0" i="0" dirty="0" err="1"/>
-              <a:t>Hardwire</a:t>
-            </a:r>
-            <a:r>
-              <a:rPr lang="pt-PT" sz="2000" b="0" i="0" dirty="0"/>
-              <a:t>:</a:t>
-            </a:r>
-          </a:p>
-          <a:p>
-            <a:pPr marL="357188" lvl="1" indent="-177800" algn="just" defTabSz="624078">
-              <a:lnSpc>
-                <a:spcPct val="120000"/>
-              </a:lnSpc>
-              <a:buFont typeface="Wingdings" pitchFamily="2" charset="2"/>
-              <a:buChar char="Ø"/>
-            </a:pPr>
-            <a:r>
-              <a:rPr lang="pt-PT" sz="1600" b="0" i="0" dirty="0"/>
-              <a:t>O mapa de descodificação de uma instrução pode ser implementado diretamente em hardware (no CPU). Esta abordagem é mais simples e normalmente mais eficiente ,que micro código, no entanto não permite atualização da tabela de </a:t>
-            </a:r>
-            <a:r>
-              <a:rPr lang="pt-PT" sz="1600" b="0" dirty="0" err="1"/>
-              <a:t>decode</a:t>
-            </a:r>
-            <a:r>
-              <a:rPr lang="pt-PT" sz="1600" b="0" i="0" dirty="0"/>
-              <a:t> do CPU.</a:t>
-            </a:r>
-          </a:p>
-        </p:txBody>
-      </p:sp>
-      <p:pic>
-        <p:nvPicPr>
-          <p:cNvPr id="1026" name="Picture 2">
-            <a:extLst>
-              <a:ext uri="{FF2B5EF4-FFF2-40B4-BE49-F238E27FC236}">
-                <a16:creationId xmlns:a16="http://schemas.microsoft.com/office/drawing/2014/main" id="{2D03A261-E6F1-45C9-BE1A-F11216615438}"/>
-              </a:ext>
-            </a:extLst>
-          </p:cNvPr>
-          <p:cNvPicPr>
-            <a:picLocks noChangeAspect="1" noChangeArrowheads="1" noCrop="1"/>
-          </p:cNvPicPr>
-          <p:nvPr/>
-        </p:nvPicPr>
-        <p:blipFill>
-          <a:blip r:embed="rId3">
-            <a:extLst>
-              <a:ext uri="{28A0092B-C50C-407E-A947-70E740481C1C}">
-                <a14:useLocalDpi xmlns:a14="http://schemas.microsoft.com/office/drawing/2010/main" val="0"/>
-              </a:ext>
-            </a:extLst>
-          </a:blip>
-          <a:srcRect/>
-          <a:stretch>
-            <a:fillRect/>
-          </a:stretch>
-        </p:blipFill>
-        <p:spPr bwMode="auto">
-          <a:xfrm>
-            <a:off x="3683901" y="1057300"/>
-            <a:ext cx="5280587" cy="4176464"/>
-          </a:xfrm>
-          <a:prstGeom prst="rect">
-            <a:avLst/>
-          </a:prstGeom>
-          <a:noFill/>
-          <a:ln>
-            <a:solidFill>
-              <a:schemeClr val="tx1"/>
-            </a:solidFill>
-          </a:ln>
-          <a:effectLst>
-            <a:outerShdw blurRad="50800" dist="38100" dir="2700000" algn="tl" rotWithShape="0">
-              <a:prstClr val="black">
-                <a:alpha val="40000"/>
-              </a:prstClr>
-            </a:outerShdw>
-          </a:effectLst>
-          <a:extLst>
-            <a:ext uri="{909E8E84-426E-40DD-AFC4-6F175D3DCCD1}">
-              <a14:hiddenFill xmlns:a14="http://schemas.microsoft.com/office/drawing/2010/main">
-                <a:solidFill>
-                  <a:srgbClr val="FFFFFF"/>
-                </a:solidFill>
-              </a14:hiddenFill>
-            </a:ext>
-          </a:extLst>
-        </p:spPr>
-      </p:pic>
-    </p:spTree>
-    <p:extLst>
-      <p:ext uri="{BB962C8B-B14F-4D97-AF65-F5344CB8AC3E}">
-        <p14:creationId xmlns:p14="http://schemas.microsoft.com/office/powerpoint/2010/main" val="2999396643"/>
-      </p:ext>
-    </p:extLst>
-  </p:cSld>
-  <p:clrMapOvr>
-    <a:masterClrMapping/>
-  </p:clrMapOvr>
-  <p:timing>
-    <p:tnLst>
-      <p:par>
-        <p:cTn id="1" dur="indefinite" restart="never" nodeType="tmRoot">
-          <p:childTnLst>
-            <p:seq concurrent="1" nextAc="seek">
-              <p:cTn id="2" dur="indefinite" nodeType="mainSeq">
-                <p:childTnLst>
-                  <p:par>
-                    <p:cTn id="3" fill="hold">
-                      <p:stCondLst>
-                        <p:cond delay="indefinite"/>
-                        <p:cond evt="onBegin" delay="0">
-                          <p:tn val="2"/>
-                        </p:cond>
-                      </p:stCondLst>
-                      <p:childTnLst>
-                        <p:par>
-                          <p:cTn id="4" fill="hold">
-                            <p:stCondLst>
-                              <p:cond delay="0"/>
-                            </p:stCondLst>
-                            <p:childTnLst>
-                              <p:par>
-                                <p:cTn id="5" presetID="42" presetClass="entr" presetSubtype="0" fill="hold" grpId="0" nodeType="afterEffect">
-                                  <p:stCondLst>
-                                    <p:cond delay="0"/>
-                                  </p:stCondLst>
-                                  <p:childTnLst>
-                                    <p:set>
-                                      <p:cBhvr>
-                                        <p:cTn id="6" dur="1" fill="hold">
-                                          <p:stCondLst>
-                                            <p:cond delay="0"/>
-                                          </p:stCondLst>
-                                        </p:cTn>
-                                        <p:tgtEl>
-                                          <p:spTgt spid="20"/>
-                                        </p:tgtEl>
-                                        <p:attrNameLst>
-                                          <p:attrName>style.visibility</p:attrName>
-                                        </p:attrNameLst>
-                                      </p:cBhvr>
-                                      <p:to>
-                                        <p:strVal val="visible"/>
-                                      </p:to>
-                                    </p:set>
-                                    <p:animEffect transition="in" filter="fade">
-                                      <p:cBhvr>
-                                        <p:cTn id="7" dur="500"/>
-                                        <p:tgtEl>
-                                          <p:spTgt spid="20"/>
-                                        </p:tgtEl>
-                                      </p:cBhvr>
-                                    </p:animEffect>
-                                    <p:anim calcmode="lin" valueType="num">
-                                      <p:cBhvr>
-                                        <p:cTn id="8" dur="500" fill="hold"/>
-                                        <p:tgtEl>
-                                          <p:spTgt spid="20"/>
-                                        </p:tgtEl>
-                                        <p:attrNameLst>
-                                          <p:attrName>ppt_x</p:attrName>
-                                        </p:attrNameLst>
-                                      </p:cBhvr>
-                                      <p:tavLst>
-                                        <p:tav tm="0">
-                                          <p:val>
-                                            <p:strVal val="#ppt_x"/>
-                                          </p:val>
-                                        </p:tav>
-                                        <p:tav tm="100000">
-                                          <p:val>
-                                            <p:strVal val="#ppt_x"/>
-                                          </p:val>
-                                        </p:tav>
-                                      </p:tavLst>
-                                    </p:anim>
-                                    <p:anim calcmode="lin" valueType="num">
-                                      <p:cBhvr>
-                                        <p:cTn id="9" dur="500" fill="hold"/>
-                                        <p:tgtEl>
-                                          <p:spTgt spid="20"/>
-                                        </p:tgtEl>
-                                        <p:attrNameLst>
-                                          <p:attrName>ppt_y</p:attrName>
-                                        </p:attrNameLst>
-                                      </p:cBhvr>
-                                      <p:tavLst>
-                                        <p:tav tm="0">
-                                          <p:val>
-                                            <p:strVal val="#ppt_y+.1"/>
-                                          </p:val>
-                                        </p:tav>
-                                        <p:tav tm="100000">
-                                          <p:val>
-                                            <p:strVal val="#ppt_y"/>
-                                          </p:val>
-                                        </p:tav>
-                                      </p:tavLst>
-                                    </p:anim>
-                                  </p:childTnLst>
-                                </p:cTn>
-                              </p:par>
-                              <p:par>
-                                <p:cTn id="10" presetID="10" presetClass="entr" presetSubtype="0" fill="hold" nodeType="withEffect">
-                                  <p:stCondLst>
-                                    <p:cond delay="0"/>
-                                  </p:stCondLst>
-                                  <p:childTnLst>
-                                    <p:set>
-                                      <p:cBhvr>
-                                        <p:cTn id="11" dur="1" fill="hold">
-                                          <p:stCondLst>
-                                            <p:cond delay="0"/>
-                                          </p:stCondLst>
-                                        </p:cTn>
-                                        <p:tgtEl>
-                                          <p:spTgt spid="1026"/>
-                                        </p:tgtEl>
-                                        <p:attrNameLst>
-                                          <p:attrName>style.visibility</p:attrName>
-                                        </p:attrNameLst>
-                                      </p:cBhvr>
-                                      <p:to>
-                                        <p:strVal val="visible"/>
-                                      </p:to>
-                                    </p:set>
-                                    <p:animEffect transition="in" filter="fade">
-                                      <p:cBhvr>
-                                        <p:cTn id="12" dur="500"/>
-                                        <p:tgtEl>
-                                          <p:spTgt spid="1026"/>
-                                        </p:tgtEl>
-                                      </p:cBhvr>
-                                    </p:animEffect>
-                                  </p:childTnLst>
-                                </p:cTn>
-                              </p:par>
-                            </p:childTnLst>
-                          </p:cTn>
-                        </p:par>
-                      </p:childTnLst>
-                    </p:cTn>
-                  </p:par>
-                </p:childTnLst>
-              </p:cTn>
-              <p:prevCondLst>
-                <p:cond evt="onPrev" delay="0">
-                  <p:tgtEl>
-                    <p:sldTgt/>
-                  </p:tgtEl>
-                </p:cond>
-              </p:prevCondLst>
-              <p:nextCondLst>
-                <p:cond evt="onNext" delay="0">
-                  <p:tgtEl>
-                    <p:sldTgt/>
-                  </p:tgtEl>
-                </p:cond>
-              </p:nextCondLst>
-            </p:seq>
-          </p:childTnLst>
-        </p:cTn>
-      </p:par>
-    </p:tnLst>
-    <p:bldLst>
-      <p:bldP spid="20" grpId="0"/>
-    </p:bldLst>
-  </p:timing>
-</p:sld>
-</file>
-
 <file path=ppt/slides/slide8.xml><?xml version="1.0" encoding="utf-8"?>
 <p:sld xmlns:a="http://schemas.openxmlformats.org/drawingml/2006/main" xmlns:r="http://schemas.openxmlformats.org/officeDocument/2006/relationships" xmlns:p="http://schemas.openxmlformats.org/presentationml/2006/main">
   <p:cSld>

</xml_diff>